<commit_message>
python module and packages
</commit_message>
<xml_diff>
--- a/Python Session/Python_23_may.pptx
+++ b/Python Session/Python_23_may.pptx
@@ -6034,11 +6034,7 @@
             <a:pPr algn="l"/>
             <a:r>
               <a:rPr lang="en-US" dirty="0" smtClean="0"/>
-              <a:t>Syntax</a:t>
-            </a:r>
-            <a:r>
-              <a:rPr lang="en-US" dirty="0" smtClean="0"/>
-              <a:t>:</a:t>
+              <a:t>Syntax:</a:t>
             </a:r>
             <a:endParaRPr lang="en-US" dirty="0"/>
           </a:p>
@@ -6050,15 +6046,7 @@
                   <a:schemeClr val="accent1"/>
                 </a:solidFill>
               </a:rPr>
-              <a:t>lambda arguments: </a:t>
-            </a:r>
-            <a:r>
-              <a:rPr lang="en-US" dirty="0" smtClean="0">
-                <a:solidFill>
-                  <a:schemeClr val="accent1"/>
-                </a:solidFill>
-              </a:rPr>
-              <a:t>expression</a:t>
+              <a:t>lambda arguments: expression</a:t>
             </a:r>
           </a:p>
           <a:p>
@@ -6071,11 +6059,6 @@
               </a:rPr>
               <a:t>Lambda x : x+2</a:t>
             </a:r>
-            <a:endParaRPr lang="en-US" dirty="0" smtClean="0">
-              <a:solidFill>
-                <a:schemeClr val="accent1"/>
-              </a:solidFill>
-            </a:endParaRPr>
           </a:p>
         </p:txBody>
       </p:sp>
@@ -6222,15 +6205,7 @@
                   <a:srgbClr val="00B0F0"/>
                 </a:solidFill>
               </a:rPr>
-              <a:t>f</a:t>
-            </a:r>
-            <a:r>
-              <a:rPr lang="en-US" dirty="0" smtClean="0">
-                <a:solidFill>
-                  <a:srgbClr val="00B0F0"/>
-                </a:solidFill>
-              </a:rPr>
-              <a:t>ilter(function, </a:t>
+              <a:t>filter(function, </a:t>
             </a:r>
             <a:r>
               <a:rPr lang="en-US" dirty="0" err="1" smtClean="0">
@@ -6248,11 +6223,6 @@
               </a:rPr>
               <a:t>)</a:t>
             </a:r>
-            <a:endParaRPr lang="en-US" dirty="0" smtClean="0">
-              <a:solidFill>
-                <a:srgbClr val="00B0F0"/>
-              </a:solidFill>
-            </a:endParaRPr>
           </a:p>
         </p:txBody>
       </p:sp>
@@ -6349,11 +6319,7 @@
             <a:pPr algn="l"/>
             <a:r>
               <a:rPr lang="en-US" dirty="0" smtClean="0"/>
-              <a:t>Map</a:t>
-            </a:r>
-            <a:r>
-              <a:rPr lang="en-US" dirty="0" smtClean="0"/>
-              <a:t>: </a:t>
+              <a:t>Map: </a:t>
             </a:r>
           </a:p>
           <a:p>
@@ -6382,8 +6348,13 @@
             <a:pPr algn="l"/>
             <a:r>
               <a:rPr lang="en-US" dirty="0"/>
-              <a:t> 1.  A function that defines the filtering constraint</a:t>
-            </a:r>
+              <a:t> 1.  A </a:t>
+            </a:r>
+            <a:r>
+              <a:rPr lang="en-US" dirty="0" smtClean="0"/>
+              <a:t>function</a:t>
+            </a:r>
+            <a:endParaRPr lang="en-US" dirty="0"/>
           </a:p>
           <a:p>
             <a:pPr algn="l"/>
@@ -6426,11 +6397,6 @@
               </a:rPr>
               <a:t>)</a:t>
             </a:r>
-            <a:endParaRPr lang="en-US" dirty="0" smtClean="0">
-              <a:solidFill>
-                <a:srgbClr val="00B0F0"/>
-              </a:solidFill>
-            </a:endParaRPr>
           </a:p>
         </p:txBody>
       </p:sp>

</xml_diff>